<commit_message>
After these changes were made: we placed highest at competition with 44 points prog skills and 42 driver. 86 total.
</commit_message>
<xml_diff>
--- a/2017/Planning/Auto Plan.pptx
+++ b/2017/Planning/Auto Plan.pptx
@@ -274,7 +274,7 @@
           <a:p>
             <a:fld id="{A65D4F8E-4BF3-4A5C-8CD9-0C4A9C56A65A}" type="datetimeFigureOut">
               <a:rPr lang="en-US" smtClean="0"/>
-              <a:t>2/17/2017</a:t>
+              <a:t>3/3/2017</a:t>
             </a:fld>
             <a:endParaRPr lang="en-US" dirty="0"/>
           </a:p>
@@ -444,7 +444,7 @@
           <a:p>
             <a:fld id="{A65D4F8E-4BF3-4A5C-8CD9-0C4A9C56A65A}" type="datetimeFigureOut">
               <a:rPr lang="en-US" smtClean="0"/>
-              <a:t>2/17/2017</a:t>
+              <a:t>3/3/2017</a:t>
             </a:fld>
             <a:endParaRPr lang="en-US" dirty="0"/>
           </a:p>
@@ -624,7 +624,7 @@
           <a:p>
             <a:fld id="{A65D4F8E-4BF3-4A5C-8CD9-0C4A9C56A65A}" type="datetimeFigureOut">
               <a:rPr lang="en-US" smtClean="0"/>
-              <a:t>2/17/2017</a:t>
+              <a:t>3/3/2017</a:t>
             </a:fld>
             <a:endParaRPr lang="en-US" dirty="0"/>
           </a:p>
@@ -794,7 +794,7 @@
           <a:p>
             <a:fld id="{A65D4F8E-4BF3-4A5C-8CD9-0C4A9C56A65A}" type="datetimeFigureOut">
               <a:rPr lang="en-US" smtClean="0"/>
-              <a:t>2/17/2017</a:t>
+              <a:t>3/3/2017</a:t>
             </a:fld>
             <a:endParaRPr lang="en-US" dirty="0"/>
           </a:p>
@@ -1040,7 +1040,7 @@
           <a:p>
             <a:fld id="{A65D4F8E-4BF3-4A5C-8CD9-0C4A9C56A65A}" type="datetimeFigureOut">
               <a:rPr lang="en-US" smtClean="0"/>
-              <a:t>2/17/2017</a:t>
+              <a:t>3/3/2017</a:t>
             </a:fld>
             <a:endParaRPr lang="en-US" dirty="0"/>
           </a:p>
@@ -1272,7 +1272,7 @@
           <a:p>
             <a:fld id="{A65D4F8E-4BF3-4A5C-8CD9-0C4A9C56A65A}" type="datetimeFigureOut">
               <a:rPr lang="en-US" smtClean="0"/>
-              <a:t>2/17/2017</a:t>
+              <a:t>3/3/2017</a:t>
             </a:fld>
             <a:endParaRPr lang="en-US" dirty="0"/>
           </a:p>
@@ -1639,7 +1639,7 @@
           <a:p>
             <a:fld id="{A65D4F8E-4BF3-4A5C-8CD9-0C4A9C56A65A}" type="datetimeFigureOut">
               <a:rPr lang="en-US" smtClean="0"/>
-              <a:t>2/17/2017</a:t>
+              <a:t>3/3/2017</a:t>
             </a:fld>
             <a:endParaRPr lang="en-US" dirty="0"/>
           </a:p>
@@ -1757,7 +1757,7 @@
           <a:p>
             <a:fld id="{A65D4F8E-4BF3-4A5C-8CD9-0C4A9C56A65A}" type="datetimeFigureOut">
               <a:rPr lang="en-US" smtClean="0"/>
-              <a:t>2/17/2017</a:t>
+              <a:t>3/3/2017</a:t>
             </a:fld>
             <a:endParaRPr lang="en-US" dirty="0"/>
           </a:p>
@@ -1852,7 +1852,7 @@
           <a:p>
             <a:fld id="{A65D4F8E-4BF3-4A5C-8CD9-0C4A9C56A65A}" type="datetimeFigureOut">
               <a:rPr lang="en-US" smtClean="0"/>
-              <a:t>2/17/2017</a:t>
+              <a:t>3/3/2017</a:t>
             </a:fld>
             <a:endParaRPr lang="en-US" dirty="0"/>
           </a:p>
@@ -2129,7 +2129,7 @@
           <a:p>
             <a:fld id="{A65D4F8E-4BF3-4A5C-8CD9-0C4A9C56A65A}" type="datetimeFigureOut">
               <a:rPr lang="en-US" smtClean="0"/>
-              <a:t>2/17/2017</a:t>
+              <a:t>3/3/2017</a:t>
             </a:fld>
             <a:endParaRPr lang="en-US" dirty="0"/>
           </a:p>
@@ -2382,7 +2382,7 @@
           <a:p>
             <a:fld id="{A65D4F8E-4BF3-4A5C-8CD9-0C4A9C56A65A}" type="datetimeFigureOut">
               <a:rPr lang="en-US" smtClean="0"/>
-              <a:t>2/17/2017</a:t>
+              <a:t>3/3/2017</a:t>
             </a:fld>
             <a:endParaRPr lang="en-US" dirty="0"/>
           </a:p>
@@ -2595,7 +2595,7 @@
           <a:p>
             <a:fld id="{A65D4F8E-4BF3-4A5C-8CD9-0C4A9C56A65A}" type="datetimeFigureOut">
               <a:rPr lang="en-US" smtClean="0"/>
-              <a:t>2/17/2017</a:t>
+              <a:t>3/3/2017</a:t>
             </a:fld>
             <a:endParaRPr lang="en-US" dirty="0"/>
           </a:p>
@@ -20144,6 +20144,137 @@
           </a:prstGeom>
         </p:spPr>
       </p:pic>
+      <p:pic>
+        <p:nvPicPr>
+          <p:cNvPr id="59" name="Picture 58"/>
+          <p:cNvPicPr>
+            <a:picLocks noChangeAspect="1"/>
+          </p:cNvPicPr>
+          <p:nvPr/>
+        </p:nvPicPr>
+        <p:blipFill>
+          <a:blip r:embed="rId3">
+            <a:extLst>
+              <a:ext uri="{28A0092B-C50C-407E-A947-70E740481C1C}">
+                <a14:useLocalDpi xmlns:a14="http://schemas.microsoft.com/office/drawing/2010/main" val="0"/>
+              </a:ext>
+            </a:extLst>
+          </a:blip>
+          <a:stretch>
+            <a:fillRect/>
+          </a:stretch>
+        </p:blipFill>
+        <p:spPr>
+          <a:xfrm>
+            <a:off x="8128274" y="3556948"/>
+            <a:ext cx="1146147" cy="1146147"/>
+          </a:xfrm>
+          <a:prstGeom prst="rect">
+            <a:avLst/>
+          </a:prstGeom>
+        </p:spPr>
+      </p:pic>
+      <p:cxnSp>
+        <p:nvCxnSpPr>
+          <p:cNvPr id="7" name="Straight Arrow Connector 6"/>
+          <p:cNvCxnSpPr/>
+          <p:nvPr/>
+        </p:nvCxnSpPr>
+        <p:spPr>
+          <a:xfrm flipH="1">
+            <a:off x="6948475" y="3634825"/>
+            <a:ext cx="2565952" cy="1474642"/>
+          </a:xfrm>
+          <a:prstGeom prst="straightConnector1">
+            <a:avLst/>
+          </a:prstGeom>
+          <a:ln>
+            <a:tailEnd type="triangle"/>
+          </a:ln>
+        </p:spPr>
+        <p:style>
+          <a:lnRef idx="1">
+            <a:schemeClr val="accent1"/>
+          </a:lnRef>
+          <a:fillRef idx="0">
+            <a:schemeClr val="accent1"/>
+          </a:fillRef>
+          <a:effectRef idx="0">
+            <a:schemeClr val="accent1"/>
+          </a:effectRef>
+          <a:fontRef idx="minor">
+            <a:schemeClr val="tx1"/>
+          </a:fontRef>
+        </p:style>
+      </p:cxnSp>
+      <p:cxnSp>
+        <p:nvCxnSpPr>
+          <p:cNvPr id="61" name="Straight Arrow Connector 60"/>
+          <p:cNvCxnSpPr/>
+          <p:nvPr/>
+        </p:nvCxnSpPr>
+        <p:spPr>
+          <a:xfrm flipH="1">
+            <a:off x="6586185" y="3633956"/>
+            <a:ext cx="2924498" cy="869"/>
+          </a:xfrm>
+          <a:prstGeom prst="straightConnector1">
+            <a:avLst/>
+          </a:prstGeom>
+          <a:ln>
+            <a:tailEnd type="triangle"/>
+          </a:ln>
+        </p:spPr>
+        <p:style>
+          <a:lnRef idx="1">
+            <a:schemeClr val="accent1"/>
+          </a:lnRef>
+          <a:fillRef idx="0">
+            <a:schemeClr val="accent1"/>
+          </a:fillRef>
+          <a:effectRef idx="0">
+            <a:schemeClr val="accent1"/>
+          </a:effectRef>
+          <a:fontRef idx="minor">
+            <a:schemeClr val="tx1"/>
+          </a:fontRef>
+        </p:style>
+      </p:cxnSp>
+      <p:cxnSp>
+        <p:nvCxnSpPr>
+          <p:cNvPr id="64" name="Straight Arrow Connector 63"/>
+          <p:cNvCxnSpPr>
+            <a:stCxn id="59" idx="0"/>
+          </p:cNvCxnSpPr>
+          <p:nvPr/>
+        </p:nvCxnSpPr>
+        <p:spPr>
+          <a:xfrm flipH="1">
+            <a:off x="8673584" y="3556948"/>
+            <a:ext cx="27764" cy="1815459"/>
+          </a:xfrm>
+          <a:prstGeom prst="straightConnector1">
+            <a:avLst/>
+          </a:prstGeom>
+          <a:ln>
+            <a:tailEnd type="triangle"/>
+          </a:ln>
+        </p:spPr>
+        <p:style>
+          <a:lnRef idx="1">
+            <a:schemeClr val="accent1"/>
+          </a:lnRef>
+          <a:fillRef idx="0">
+            <a:schemeClr val="accent1"/>
+          </a:fillRef>
+          <a:effectRef idx="0">
+            <a:schemeClr val="accent1"/>
+          </a:effectRef>
+          <a:fontRef idx="minor">
+            <a:schemeClr val="tx1"/>
+          </a:fontRef>
+        </p:style>
+      </p:cxnSp>
     </p:spTree>
     <p:extLst>
       <p:ext uri="{BB962C8B-B14F-4D97-AF65-F5344CB8AC3E}">

</xml_diff>